<commit_message>
Update presentation to include code entry points for fitting engine.
</commit_message>
<xml_diff>
--- a/Training/New_Contributor_Training/presentations/SasviewDataStructure.pptx
+++ b/Training/New_Contributor_Training/presentations/SasviewDataStructure.pptx
@@ -6865,7 +6865,7 @@
           <a:p>
             <a:fld id="{D8D014D1-F58A-49BF-A62E-B6E90FDE41A6}" type="datetimeFigureOut">
               <a:rPr lang="en-US" smtClean="0"/>
-              <a:t>5/18/2021</a:t>
+              <a:t>5/19/2021</a:t>
             </a:fld>
             <a:endParaRPr lang="en-US"/>
           </a:p>
@@ -7063,7 +7063,7 @@
           <a:p>
             <a:fld id="{D8D014D1-F58A-49BF-A62E-B6E90FDE41A6}" type="datetimeFigureOut">
               <a:rPr lang="en-US" smtClean="0"/>
-              <a:t>5/18/2021</a:t>
+              <a:t>5/19/2021</a:t>
             </a:fld>
             <a:endParaRPr lang="en-US"/>
           </a:p>
@@ -7271,7 +7271,7 @@
           <a:p>
             <a:fld id="{D8D014D1-F58A-49BF-A62E-B6E90FDE41A6}" type="datetimeFigureOut">
               <a:rPr lang="en-US" smtClean="0"/>
-              <a:t>5/18/2021</a:t>
+              <a:t>5/19/2021</a:t>
             </a:fld>
             <a:endParaRPr lang="en-US"/>
           </a:p>
@@ -7469,7 +7469,7 @@
           <a:p>
             <a:fld id="{D8D014D1-F58A-49BF-A62E-B6E90FDE41A6}" type="datetimeFigureOut">
               <a:rPr lang="en-US" smtClean="0"/>
-              <a:t>5/18/2021</a:t>
+              <a:t>5/19/2021</a:t>
             </a:fld>
             <a:endParaRPr lang="en-US"/>
           </a:p>
@@ -7744,7 +7744,7 @@
           <a:p>
             <a:fld id="{D8D014D1-F58A-49BF-A62E-B6E90FDE41A6}" type="datetimeFigureOut">
               <a:rPr lang="en-US" smtClean="0"/>
-              <a:t>5/18/2021</a:t>
+              <a:t>5/19/2021</a:t>
             </a:fld>
             <a:endParaRPr lang="en-US"/>
           </a:p>
@@ -8009,7 +8009,7 @@
           <a:p>
             <a:fld id="{D8D014D1-F58A-49BF-A62E-B6E90FDE41A6}" type="datetimeFigureOut">
               <a:rPr lang="en-US" smtClean="0"/>
-              <a:t>5/18/2021</a:t>
+              <a:t>5/19/2021</a:t>
             </a:fld>
             <a:endParaRPr lang="en-US"/>
           </a:p>
@@ -8421,7 +8421,7 @@
           <a:p>
             <a:fld id="{D8D014D1-F58A-49BF-A62E-B6E90FDE41A6}" type="datetimeFigureOut">
               <a:rPr lang="en-US" smtClean="0"/>
-              <a:t>5/18/2021</a:t>
+              <a:t>5/19/2021</a:t>
             </a:fld>
             <a:endParaRPr lang="en-US"/>
           </a:p>
@@ -8562,7 +8562,7 @@
           <a:p>
             <a:fld id="{D8D014D1-F58A-49BF-A62E-B6E90FDE41A6}" type="datetimeFigureOut">
               <a:rPr lang="en-US" smtClean="0"/>
-              <a:t>5/18/2021</a:t>
+              <a:t>5/19/2021</a:t>
             </a:fld>
             <a:endParaRPr lang="en-US"/>
           </a:p>
@@ -8675,7 +8675,7 @@
           <a:p>
             <a:fld id="{D8D014D1-F58A-49BF-A62E-B6E90FDE41A6}" type="datetimeFigureOut">
               <a:rPr lang="en-US" smtClean="0"/>
-              <a:t>5/18/2021</a:t>
+              <a:t>5/19/2021</a:t>
             </a:fld>
             <a:endParaRPr lang="en-US"/>
           </a:p>
@@ -8986,7 +8986,7 @@
           <a:p>
             <a:fld id="{D8D014D1-F58A-49BF-A62E-B6E90FDE41A6}" type="datetimeFigureOut">
               <a:rPr lang="en-US" smtClean="0"/>
-              <a:t>5/18/2021</a:t>
+              <a:t>5/19/2021</a:t>
             </a:fld>
             <a:endParaRPr lang="en-US"/>
           </a:p>
@@ -9274,7 +9274,7 @@
           <a:p>
             <a:fld id="{D8D014D1-F58A-49BF-A62E-B6E90FDE41A6}" type="datetimeFigureOut">
               <a:rPr lang="en-US" smtClean="0"/>
-              <a:t>5/18/2021</a:t>
+              <a:t>5/19/2021</a:t>
             </a:fld>
             <a:endParaRPr lang="en-US"/>
           </a:p>
@@ -9515,7 +9515,7 @@
           <a:p>
             <a:fld id="{D8D014D1-F58A-49BF-A62E-B6E90FDE41A6}" type="datetimeFigureOut">
               <a:rPr lang="en-US" smtClean="0"/>
-              <a:t>5/18/2021</a:t>
+              <a:t>5/19/2021</a:t>
             </a:fld>
             <a:endParaRPr lang="en-US"/>
           </a:p>
@@ -15006,7 +15006,7 @@
           <p:nvPr>
             <p:extLst>
               <p:ext uri="{D42A27DB-BD31-4B8C-83A1-F6EECF244321}">
-                <p14:modId xmlns:p14="http://schemas.microsoft.com/office/powerpoint/2010/main" val="2034782147"/>
+                <p14:modId xmlns:p14="http://schemas.microsoft.com/office/powerpoint/2010/main" val="1184312597"/>
               </p:ext>
             </p:extLst>
           </p:nvPr>
@@ -15711,7 +15711,14 @@
                     <a:lstStyle/>
                     <a:p>
                       <a:pPr algn="ctr"/>
-                      <a:endParaRPr lang="en-US" sz="1000" dirty="0"/>
+                      <a:r>
+                        <a:rPr lang="en-US" sz="1000" dirty="0" err="1"/>
+                        <a:t>Sasmodels.product.make_product_info</a:t>
+                      </a:r>
+                      <a:r>
+                        <a:rPr lang="en-US" sz="1000" dirty="0"/>
+                        <a:t>()</a:t>
+                      </a:r>
                     </a:p>
                   </a:txBody>
                   <a:tcPr anchor="ctr"/>
@@ -15826,7 +15833,14 @@
                     <a:lstStyle/>
                     <a:p>
                       <a:pPr algn="ctr"/>
-                      <a:endParaRPr lang="en-US" sz="1000" dirty="0"/>
+                      <a:r>
+                        <a:rPr lang="en-US" sz="1000" dirty="0" err="1"/>
+                        <a:t>Sasmodels.modelinfo.make_model_info</a:t>
+                      </a:r>
+                      <a:r>
+                        <a:rPr lang="en-US" sz="1000" dirty="0"/>
+                        <a:t>()</a:t>
+                      </a:r>
                     </a:p>
                   </a:txBody>
                   <a:tcPr anchor="ctr"/>
@@ -16039,7 +16053,14 @@
                     <a:lstStyle/>
                     <a:p>
                       <a:pPr algn="ctr"/>
-                      <a:endParaRPr lang="en-US" sz="1000" dirty="0"/>
+                      <a:r>
+                        <a:rPr lang="en-US" sz="1000" dirty="0" err="1"/>
+                        <a:t>Sascalc.fit.BumpsFitting.BumpsFit</a:t>
+                      </a:r>
+                      <a:r>
+                        <a:rPr lang="en-US" sz="1000" dirty="0"/>
+                        <a:t>().fit()</a:t>
+                      </a:r>
                     </a:p>
                   </a:txBody>
                   <a:tcPr anchor="ctr"/>
@@ -16119,7 +16140,10 @@
                     <a:lstStyle/>
                     <a:p>
                       <a:pPr algn="ctr"/>
-                      <a:endParaRPr lang="en-US" sz="1000" dirty="0"/>
+                      <a:r>
+                        <a:rPr lang="en-US" sz="1000" dirty="0"/>
+                        <a:t>-</a:t>
+                      </a:r>
                     </a:p>
                   </a:txBody>
                   <a:tcPr anchor="ctr"/>
@@ -22074,7 +22098,7 @@
           <p:nvPr>
             <p:extLst>
               <p:ext uri="{D42A27DB-BD31-4B8C-83A1-F6EECF244321}">
-                <p14:modId xmlns:p14="http://schemas.microsoft.com/office/powerpoint/2010/main" val="492104005"/>
+                <p14:modId xmlns:p14="http://schemas.microsoft.com/office/powerpoint/2010/main" val="669341125"/>
               </p:ext>
             </p:extLst>
           </p:nvPr>
@@ -22262,7 +22286,10 @@
                         <a:tabLst/>
                         <a:defRPr/>
                       </a:pPr>
-                      <a:endParaRPr lang="en-US" sz="1000" dirty="0"/>
+                      <a:r>
+                        <a:rPr lang="en-US" sz="1000" dirty="0"/>
+                        <a:t>-</a:t>
+                      </a:r>
                     </a:p>
                   </a:txBody>
                   <a:tcPr anchor="ctr"/>

</xml_diff>